<commit_message>
Add slides for Multicore
</commit_message>
<xml_diff>
--- a/static/slides/L12-prefetching.pptx
+++ b/static/slides/L12-prefetching.pptx
@@ -240,7 +240,7 @@
             <a:fld id="{3A00BFCF-8F27-4775-A75C-FAB6C4D28C2C}" type="datetimeFigureOut">
               <a:rPr lang="en-US" smtClean="0"/>
               <a:pPr/>
-              <a:t>3/31/20</a:t>
+              <a:t>4/2/20</a:t>
             </a:fld>
             <a:endParaRPr lang="en-US"/>
           </a:p>
@@ -48204,14 +48204,10 @@
           <a:p>
             <a:pPr lvl="1"/>
             <a:r>
-              <a:rPr lang="en-US" dirty="0"/>
-              <a:t>Predictors </a:t>
-            </a:r>
-            <a:r>
               <a:rPr lang="en-US" dirty="0">
                 <a:sym typeface="Wingdings" pitchFamily="2" charset="2"/>
               </a:rPr>
-              <a:t>regular </a:t>
+              <a:t>Regular </a:t>
             </a:r>
             <a:r>
               <a:rPr lang="en-US" dirty="0"/>
@@ -48222,7 +48218,7 @@
             <a:pPr lvl="1"/>
             <a:r>
               <a:rPr lang="en-US" dirty="0"/>
-              <a:t>Predicted correlated patterns (A…B-&gt;C, B..C-&gt;J, A..C-&gt;K, …)</a:t>
+              <a:t>Correlated patterns (A…B-&gt;C, B..C-&gt;J, A..C-&gt;K, …)</a:t>
             </a:r>
           </a:p>
           <a:p>

</xml_diff>